<commit_message>
updated: numeros clases, +presentaciones, readme
</commit_message>
<xml_diff>
--- a/04_markov/ejercicios/clase05_ejercicio_7/ejercicio_7.pptx
+++ b/04_markov/ejercicios/clase05_ejercicio_7/ejercicio_7.pptx
@@ -7086,13 +7086,22 @@
               <a:buNone/>
             </a:pPr>
             <a:r>
-              <a:rPr lang="en" sz="5000" dirty="0">
+              <a:rPr lang="es-ES" sz="5000" dirty="0" err="1">
                 <a:latin typeface="Helvetica Neue"/>
                 <a:ea typeface="Helvetica Neue"/>
                 <a:cs typeface="Helvetica Neue"/>
                 <a:sym typeface="Helvetica Neue"/>
               </a:rPr>
-              <a:t>Título del tema</a:t>
+              <a:t>Markov</a:t>
+            </a:r>
+            <a:r>
+              <a:rPr lang="es-ES" sz="5000" dirty="0">
+                <a:latin typeface="Helvetica Neue"/>
+                <a:ea typeface="Helvetica Neue"/>
+                <a:cs typeface="Helvetica Neue"/>
+                <a:sym typeface="Helvetica Neue"/>
+              </a:rPr>
+              <a:t>: Ejercicio 7</a:t>
             </a:r>
             <a:endParaRPr sz="5000" dirty="0">
               <a:latin typeface="Helvetica Neue"/>
@@ -7640,8 +7649,8 @@
           </a:p>
         </p:txBody>
       </p:sp>
-      <mc:AlternateContent xmlns:mc="http://schemas.openxmlformats.org/markup-compatibility/2006">
-        <mc:Choice xmlns:a14="http://schemas.microsoft.com/office/drawing/2010/main" Requires="a14">
+      <mc:AlternateContent xmlns:mc="http://schemas.openxmlformats.org/markup-compatibility/2006" xmlns:a14="http://schemas.microsoft.com/office/drawing/2010/main">
+        <mc:Choice Requires="a14">
           <p:sp>
             <p:nvSpPr>
               <p:cNvPr id="4" name="Rectángulo 3">
@@ -7747,7 +7756,7 @@
             </p:txBody>
           </p:sp>
         </mc:Choice>
-        <mc:Fallback>
+        <mc:Fallback xmlns="">
           <p:sp>
             <p:nvSpPr>
               <p:cNvPr id="4" name="Rectángulo 3">
@@ -7792,8 +7801,8 @@
           </p:sp>
         </mc:Fallback>
       </mc:AlternateContent>
-      <mc:AlternateContent xmlns:mc="http://schemas.openxmlformats.org/markup-compatibility/2006">
-        <mc:Choice xmlns:a14="http://schemas.microsoft.com/office/drawing/2010/main" Requires="a14">
+      <mc:AlternateContent xmlns:mc="http://schemas.openxmlformats.org/markup-compatibility/2006" xmlns:a14="http://schemas.microsoft.com/office/drawing/2010/main">
+        <mc:Choice Requires="a14">
           <p:sp>
             <p:nvSpPr>
               <p:cNvPr id="5" name="Rectángulo 4">
@@ -8631,7 +8640,7 @@
             </p:txBody>
           </p:sp>
         </mc:Choice>
-        <mc:Fallback>
+        <mc:Fallback xmlns="">
           <p:sp>
             <p:nvSpPr>
               <p:cNvPr id="5" name="Rectángulo 4">
@@ -8676,8 +8685,8 @@
           </p:sp>
         </mc:Fallback>
       </mc:AlternateContent>
-      <mc:AlternateContent xmlns:mc="http://schemas.openxmlformats.org/markup-compatibility/2006">
-        <mc:Choice xmlns:a14="http://schemas.microsoft.com/office/drawing/2010/main" Requires="a14">
+      <mc:AlternateContent xmlns:mc="http://schemas.openxmlformats.org/markup-compatibility/2006" xmlns:a14="http://schemas.microsoft.com/office/drawing/2010/main">
+        <mc:Choice Requires="a14">
           <p:sp>
             <p:nvSpPr>
               <p:cNvPr id="6" name="Rectángulo 5">
@@ -9660,7 +9669,7 @@
             </p:txBody>
           </p:sp>
         </mc:Choice>
-        <mc:Fallback>
+        <mc:Fallback xmlns="">
           <p:sp>
             <p:nvSpPr>
               <p:cNvPr id="6" name="Rectángulo 5">
@@ -9953,8 +9962,8 @@
           </a:p>
         </p:txBody>
       </p:sp>
-      <mc:AlternateContent xmlns:mc="http://schemas.openxmlformats.org/markup-compatibility/2006">
-        <mc:Choice xmlns:a14="http://schemas.microsoft.com/office/drawing/2010/main" Requires="a14">
+      <mc:AlternateContent xmlns:mc="http://schemas.openxmlformats.org/markup-compatibility/2006" xmlns:a14="http://schemas.microsoft.com/office/drawing/2010/main">
+        <mc:Choice Requires="a14">
           <p:sp>
             <p:nvSpPr>
               <p:cNvPr id="4" name="Rectángulo 3">
@@ -10625,7 +10634,7 @@
             </p:txBody>
           </p:sp>
         </mc:Choice>
-        <mc:Fallback>
+        <mc:Fallback xmlns="">
           <p:sp>
             <p:nvSpPr>
               <p:cNvPr id="4" name="Rectángulo 3">
@@ -10827,8 +10836,8 @@
           </a:p>
         </p:txBody>
       </p:sp>
-      <mc:AlternateContent xmlns:mc="http://schemas.openxmlformats.org/markup-compatibility/2006">
-        <mc:Choice xmlns:a14="http://schemas.microsoft.com/office/drawing/2010/main" Requires="a14">
+      <mc:AlternateContent xmlns:mc="http://schemas.openxmlformats.org/markup-compatibility/2006" xmlns:a14="http://schemas.microsoft.com/office/drawing/2010/main">
+        <mc:Choice Requires="a14">
           <p:sp>
             <p:nvSpPr>
               <p:cNvPr id="7" name="Rectángulo 6">
@@ -11152,7 +11161,7 @@
             </p:txBody>
           </p:sp>
         </mc:Choice>
-        <mc:Fallback>
+        <mc:Fallback xmlns="">
           <p:sp>
             <p:nvSpPr>
               <p:cNvPr id="7" name="Rectángulo 6">
@@ -11272,8 +11281,8 @@
           </a:p>
         </p:txBody>
       </p:sp>
-      <mc:AlternateContent xmlns:mc="http://schemas.openxmlformats.org/markup-compatibility/2006">
-        <mc:Choice xmlns:a14="http://schemas.microsoft.com/office/drawing/2010/main" Requires="a14">
+      <mc:AlternateContent xmlns:mc="http://schemas.openxmlformats.org/markup-compatibility/2006" xmlns:a14="http://schemas.microsoft.com/office/drawing/2010/main">
+        <mc:Choice Requires="a14">
           <p:sp>
             <p:nvSpPr>
               <p:cNvPr id="9" name="Rectángulo 8">
@@ -12202,7 +12211,7 @@
             </p:txBody>
           </p:sp>
         </mc:Choice>
-        <mc:Fallback>
+        <mc:Fallback xmlns="">
           <p:sp>
             <p:nvSpPr>
               <p:cNvPr id="9" name="Rectángulo 8">
@@ -12707,8 +12716,8 @@
           </a:p>
         </p:txBody>
       </p:sp>
-      <mc:AlternateContent xmlns:mc="http://schemas.openxmlformats.org/markup-compatibility/2006">
-        <mc:Choice xmlns:a14="http://schemas.microsoft.com/office/drawing/2010/main" Requires="a14">
+      <mc:AlternateContent xmlns:mc="http://schemas.openxmlformats.org/markup-compatibility/2006" xmlns:a14="http://schemas.microsoft.com/office/drawing/2010/main">
+        <mc:Choice Requires="a14">
           <p:sp>
             <p:nvSpPr>
               <p:cNvPr id="9" name="Rectángulo 8">
@@ -13823,7 +13832,7 @@
             </p:txBody>
           </p:sp>
         </mc:Choice>
-        <mc:Fallback>
+        <mc:Fallback xmlns="">
           <p:sp>
             <p:nvSpPr>
               <p:cNvPr id="9" name="Rectángulo 8">
@@ -13868,8 +13877,8 @@
           </p:sp>
         </mc:Fallback>
       </mc:AlternateContent>
-      <mc:AlternateContent xmlns:mc="http://schemas.openxmlformats.org/markup-compatibility/2006">
-        <mc:Choice xmlns:a14="http://schemas.microsoft.com/office/drawing/2010/main" Requires="a14">
+      <mc:AlternateContent xmlns:mc="http://schemas.openxmlformats.org/markup-compatibility/2006" xmlns:a14="http://schemas.microsoft.com/office/drawing/2010/main">
+        <mc:Choice Requires="a14">
           <p:sp>
             <p:nvSpPr>
               <p:cNvPr id="10" name="Rectángulo 9">
@@ -14653,7 +14662,7 @@
             </p:txBody>
           </p:sp>
         </mc:Choice>
-        <mc:Fallback>
+        <mc:Fallback xmlns="">
           <p:sp>
             <p:nvSpPr>
               <p:cNvPr id="10" name="Rectángulo 9">
@@ -14894,8 +14903,8 @@
           </a:p>
         </p:txBody>
       </p:sp>
-      <mc:AlternateContent xmlns:mc="http://schemas.openxmlformats.org/markup-compatibility/2006">
-        <mc:Choice xmlns:a14="http://schemas.microsoft.com/office/drawing/2010/main" Requires="a14">
+      <mc:AlternateContent xmlns:mc="http://schemas.openxmlformats.org/markup-compatibility/2006" xmlns:a14="http://schemas.microsoft.com/office/drawing/2010/main">
+        <mc:Choice Requires="a14">
           <p:sp>
             <p:nvSpPr>
               <p:cNvPr id="3" name="Rectángulo 2">
@@ -15001,7 +15010,7 @@
             </p:txBody>
           </p:sp>
         </mc:Choice>
-        <mc:Fallback>
+        <mc:Fallback xmlns="">
           <p:sp>
             <p:nvSpPr>
               <p:cNvPr id="3" name="Rectángulo 2">
@@ -15046,8 +15055,8 @@
           </p:sp>
         </mc:Fallback>
       </mc:AlternateContent>
-      <mc:AlternateContent xmlns:mc="http://schemas.openxmlformats.org/markup-compatibility/2006">
-        <mc:Choice xmlns:a14="http://schemas.microsoft.com/office/drawing/2010/main" Requires="a14">
+      <mc:AlternateContent xmlns:mc="http://schemas.openxmlformats.org/markup-compatibility/2006" xmlns:a14="http://schemas.microsoft.com/office/drawing/2010/main">
+        <mc:Choice Requires="a14">
           <p:sp>
             <p:nvSpPr>
               <p:cNvPr id="4" name="Rectángulo 3">
@@ -15152,7 +15161,7 @@
             </p:txBody>
           </p:sp>
         </mc:Choice>
-        <mc:Fallback>
+        <mc:Fallback xmlns="">
           <p:sp>
             <p:nvSpPr>
               <p:cNvPr id="4" name="Rectángulo 3">
@@ -15197,8 +15206,8 @@
           </p:sp>
         </mc:Fallback>
       </mc:AlternateContent>
-      <mc:AlternateContent xmlns:mc="http://schemas.openxmlformats.org/markup-compatibility/2006">
-        <mc:Choice xmlns:a14="http://schemas.microsoft.com/office/drawing/2010/main" Requires="a14">
+      <mc:AlternateContent xmlns:mc="http://schemas.openxmlformats.org/markup-compatibility/2006" xmlns:a14="http://schemas.microsoft.com/office/drawing/2010/main">
+        <mc:Choice Requires="a14">
           <p:sp>
             <p:nvSpPr>
               <p:cNvPr id="5" name="Rectángulo 4">
@@ -15314,7 +15323,7 @@
             </p:txBody>
           </p:sp>
         </mc:Choice>
-        <mc:Fallback>
+        <mc:Fallback xmlns="">
           <p:sp>
             <p:nvSpPr>
               <p:cNvPr id="5" name="Rectángulo 4">
@@ -15359,8 +15368,8 @@
           </p:sp>
         </mc:Fallback>
       </mc:AlternateContent>
-      <mc:AlternateContent xmlns:mc="http://schemas.openxmlformats.org/markup-compatibility/2006">
-        <mc:Choice xmlns:a14="http://schemas.microsoft.com/office/drawing/2010/main" Requires="a14">
+      <mc:AlternateContent xmlns:mc="http://schemas.openxmlformats.org/markup-compatibility/2006" xmlns:a14="http://schemas.microsoft.com/office/drawing/2010/main">
+        <mc:Choice Requires="a14">
           <p:sp>
             <p:nvSpPr>
               <p:cNvPr id="6" name="Rectángulo 5">
@@ -15516,7 +15525,7 @@
             </p:txBody>
           </p:sp>
         </mc:Choice>
-        <mc:Fallback>
+        <mc:Fallback xmlns="">
           <p:sp>
             <p:nvSpPr>
               <p:cNvPr id="6" name="Rectángulo 5">
@@ -15786,8 +15795,8 @@
           </a:p>
         </p:txBody>
       </p:sp>
-      <mc:AlternateContent xmlns:mc="http://schemas.openxmlformats.org/markup-compatibility/2006">
-        <mc:Choice xmlns:a14="http://schemas.microsoft.com/office/drawing/2010/main" Requires="a14">
+      <mc:AlternateContent xmlns:mc="http://schemas.openxmlformats.org/markup-compatibility/2006" xmlns:a14="http://schemas.microsoft.com/office/drawing/2010/main">
+        <mc:Choice Requires="a14">
           <p:sp>
             <p:nvSpPr>
               <p:cNvPr id="4" name="Rectángulo 3">
@@ -16006,7 +16015,7 @@
             </p:txBody>
           </p:sp>
         </mc:Choice>
-        <mc:Fallback>
+        <mc:Fallback xmlns="">
           <p:sp>
             <p:nvSpPr>
               <p:cNvPr id="4" name="Rectángulo 3">
@@ -16154,8 +16163,8 @@
           </a:p>
         </p:txBody>
       </p:sp>
-      <mc:AlternateContent xmlns:mc="http://schemas.openxmlformats.org/markup-compatibility/2006">
-        <mc:Choice xmlns:a14="http://schemas.microsoft.com/office/drawing/2010/main" Requires="a14">
+      <mc:AlternateContent xmlns:mc="http://schemas.openxmlformats.org/markup-compatibility/2006" xmlns:a14="http://schemas.microsoft.com/office/drawing/2010/main">
+        <mc:Choice Requires="a14">
           <p:sp>
             <p:nvSpPr>
               <p:cNvPr id="3" name="Rectángulo 2">
@@ -16569,7 +16578,7 @@
             </p:txBody>
           </p:sp>
         </mc:Choice>
-        <mc:Fallback>
+        <mc:Fallback xmlns="">
           <p:sp>
             <p:nvSpPr>
               <p:cNvPr id="3" name="Rectángulo 2">
@@ -16789,8 +16798,8 @@
           </a:prstGeom>
         </p:spPr>
       </p:pic>
-      <mc:AlternateContent xmlns:mc="http://schemas.openxmlformats.org/markup-compatibility/2006">
-        <mc:Choice xmlns:a14="http://schemas.microsoft.com/office/drawing/2010/main" Requires="a14">
+      <mc:AlternateContent xmlns:mc="http://schemas.openxmlformats.org/markup-compatibility/2006" xmlns:a14="http://schemas.microsoft.com/office/drawing/2010/main">
+        <mc:Choice Requires="a14">
           <p:sp>
             <p:nvSpPr>
               <p:cNvPr id="5" name="Rectángulo 4">
@@ -17175,7 +17184,7 @@
             </p:txBody>
           </p:sp>
         </mc:Choice>
-        <mc:Fallback>
+        <mc:Fallback xmlns="">
           <p:sp>
             <p:nvSpPr>
               <p:cNvPr id="5" name="Rectángulo 4">
@@ -17220,8 +17229,8 @@
           </p:sp>
         </mc:Fallback>
       </mc:AlternateContent>
-      <mc:AlternateContent xmlns:mc="http://schemas.openxmlformats.org/markup-compatibility/2006">
-        <mc:Choice xmlns:a14="http://schemas.microsoft.com/office/drawing/2010/main" Requires="a14">
+      <mc:AlternateContent xmlns:mc="http://schemas.openxmlformats.org/markup-compatibility/2006" xmlns:a14="http://schemas.microsoft.com/office/drawing/2010/main">
+        <mc:Choice Requires="a14">
           <p:sp>
             <p:nvSpPr>
               <p:cNvPr id="6" name="Rectángulo 5">
@@ -17628,7 +17637,7 @@
             </p:txBody>
           </p:sp>
         </mc:Choice>
-        <mc:Fallback>
+        <mc:Fallback xmlns="">
           <p:sp>
             <p:nvSpPr>
               <p:cNvPr id="6" name="Rectángulo 5">
@@ -17673,8 +17682,8 @@
           </p:sp>
         </mc:Fallback>
       </mc:AlternateContent>
-      <mc:AlternateContent xmlns:mc="http://schemas.openxmlformats.org/markup-compatibility/2006">
-        <mc:Choice xmlns:a14="http://schemas.microsoft.com/office/drawing/2010/main" Requires="a14">
+      <mc:AlternateContent xmlns:mc="http://schemas.openxmlformats.org/markup-compatibility/2006" xmlns:a14="http://schemas.microsoft.com/office/drawing/2010/main">
+        <mc:Choice Requires="a14">
           <p:sp>
             <p:nvSpPr>
               <p:cNvPr id="7" name="Rectángulo 6">
@@ -18005,7 +18014,7 @@
             </p:txBody>
           </p:sp>
         </mc:Choice>
-        <mc:Fallback>
+        <mc:Fallback xmlns="">
           <p:sp>
             <p:nvSpPr>
               <p:cNvPr id="7" name="Rectángulo 6">
@@ -18592,8 +18601,8 @@
           </a:p>
         </p:txBody>
       </p:sp>
-      <mc:AlternateContent xmlns:mc="http://schemas.openxmlformats.org/markup-compatibility/2006">
-        <mc:Choice xmlns:a14="http://schemas.microsoft.com/office/drawing/2010/main" Requires="a14">
+      <mc:AlternateContent xmlns:mc="http://schemas.openxmlformats.org/markup-compatibility/2006" xmlns:a14="http://schemas.microsoft.com/office/drawing/2010/main">
+        <mc:Choice Requires="a14">
           <p:sp>
             <p:nvSpPr>
               <p:cNvPr id="6" name="CuadroTexto 5">
@@ -18709,7 +18718,7 @@
             </p:txBody>
           </p:sp>
         </mc:Choice>
-        <mc:Fallback>
+        <mc:Fallback xmlns="">
           <p:sp>
             <p:nvSpPr>
               <p:cNvPr id="6" name="CuadroTexto 5">
@@ -18816,8 +18825,8 @@
           </a:p>
         </p:txBody>
       </p:sp>
-      <mc:AlternateContent xmlns:mc="http://schemas.openxmlformats.org/markup-compatibility/2006">
-        <mc:Choice xmlns:a14="http://schemas.microsoft.com/office/drawing/2010/main" Requires="a14">
+      <mc:AlternateContent xmlns:mc="http://schemas.openxmlformats.org/markup-compatibility/2006" xmlns:a14="http://schemas.microsoft.com/office/drawing/2010/main">
+        <mc:Choice Requires="a14">
           <p:sp>
             <p:nvSpPr>
               <p:cNvPr id="8" name="CuadroTexto 7">
@@ -18937,7 +18946,7 @@
             </p:txBody>
           </p:sp>
         </mc:Choice>
-        <mc:Fallback>
+        <mc:Fallback xmlns="">
           <p:sp>
             <p:nvSpPr>
               <p:cNvPr id="8" name="CuadroTexto 7">
@@ -19713,8 +19722,8 @@
           </a:p>
         </p:txBody>
       </p:sp>
-      <mc:AlternateContent xmlns:mc="http://schemas.openxmlformats.org/markup-compatibility/2006">
-        <mc:Choice xmlns:a14="http://schemas.microsoft.com/office/drawing/2010/main" Requires="a14">
+      <mc:AlternateContent xmlns:mc="http://schemas.openxmlformats.org/markup-compatibility/2006" xmlns:a14="http://schemas.microsoft.com/office/drawing/2010/main">
+        <mc:Choice Requires="a14">
           <p:sp>
             <p:nvSpPr>
               <p:cNvPr id="3" name="CuadroTexto 2">
@@ -20294,7 +20303,7 @@
             </p:txBody>
           </p:sp>
         </mc:Choice>
-        <mc:Fallback>
+        <mc:Fallback xmlns="">
           <p:sp>
             <p:nvSpPr>
               <p:cNvPr id="3" name="CuadroTexto 2">
@@ -20339,8 +20348,8 @@
           </p:sp>
         </mc:Fallback>
       </mc:AlternateContent>
-      <mc:AlternateContent xmlns:mc="http://schemas.openxmlformats.org/markup-compatibility/2006">
-        <mc:Choice xmlns:a14="http://schemas.microsoft.com/office/drawing/2010/main" Requires="a14">
+      <mc:AlternateContent xmlns:mc="http://schemas.openxmlformats.org/markup-compatibility/2006" xmlns:a14="http://schemas.microsoft.com/office/drawing/2010/main">
+        <mc:Choice Requires="a14">
           <p:sp>
             <p:nvSpPr>
               <p:cNvPr id="4" name="Rectángulo 3">
@@ -20650,7 +20659,7 @@
             </p:txBody>
           </p:sp>
         </mc:Choice>
-        <mc:Fallback>
+        <mc:Fallback xmlns="">
           <p:sp>
             <p:nvSpPr>
               <p:cNvPr id="4" name="Rectángulo 3">
@@ -20914,8 +20923,8 @@
           </a:p>
         </p:txBody>
       </p:sp>
-      <mc:AlternateContent xmlns:mc="http://schemas.openxmlformats.org/markup-compatibility/2006">
-        <mc:Choice xmlns:a14="http://schemas.microsoft.com/office/drawing/2010/main" Requires="a14">
+      <mc:AlternateContent xmlns:mc="http://schemas.openxmlformats.org/markup-compatibility/2006" xmlns:a14="http://schemas.microsoft.com/office/drawing/2010/main">
+        <mc:Choice Requires="a14">
           <p:sp>
             <p:nvSpPr>
               <p:cNvPr id="6" name="CuadroTexto 5">
@@ -21442,7 +21451,7 @@
             </p:txBody>
           </p:sp>
         </mc:Choice>
-        <mc:Fallback>
+        <mc:Fallback xmlns="">
           <p:sp>
             <p:nvSpPr>
               <p:cNvPr id="6" name="CuadroTexto 5">
@@ -21487,8 +21496,8 @@
           </p:sp>
         </mc:Fallback>
       </mc:AlternateContent>
-      <mc:AlternateContent xmlns:mc="http://schemas.openxmlformats.org/markup-compatibility/2006">
-        <mc:Choice xmlns:a14="http://schemas.microsoft.com/office/drawing/2010/main" Requires="a14">
+      <mc:AlternateContent xmlns:mc="http://schemas.openxmlformats.org/markup-compatibility/2006" xmlns:a14="http://schemas.microsoft.com/office/drawing/2010/main">
+        <mc:Choice Requires="a14">
           <p:sp>
             <p:nvSpPr>
               <p:cNvPr id="7" name="Rectángulo 6">
@@ -21796,7 +21805,7 @@
             </p:txBody>
           </p:sp>
         </mc:Choice>
-        <mc:Fallback>
+        <mc:Fallback xmlns="">
           <p:sp>
             <p:nvSpPr>
               <p:cNvPr id="7" name="Rectángulo 6">
@@ -21841,8 +21850,8 @@
           </p:sp>
         </mc:Fallback>
       </mc:AlternateContent>
-      <mc:AlternateContent xmlns:mc="http://schemas.openxmlformats.org/markup-compatibility/2006">
-        <mc:Choice xmlns:a14="http://schemas.microsoft.com/office/drawing/2010/main" Requires="a14">
+      <mc:AlternateContent xmlns:mc="http://schemas.openxmlformats.org/markup-compatibility/2006" xmlns:a14="http://schemas.microsoft.com/office/drawing/2010/main">
+        <mc:Choice Requires="a14">
           <p:sp>
             <p:nvSpPr>
               <p:cNvPr id="8" name="CuadroTexto 7">
@@ -22216,7 +22225,7 @@
             </p:txBody>
           </p:sp>
         </mc:Choice>
-        <mc:Fallback>
+        <mc:Fallback xmlns="">
           <p:sp>
             <p:nvSpPr>
               <p:cNvPr id="8" name="CuadroTexto 7">
@@ -22704,8 +22713,8 @@
             </a:prstGeom>
           </p:spPr>
         </p:pic>
-        <mc:AlternateContent xmlns:mc="http://schemas.openxmlformats.org/markup-compatibility/2006">
-          <mc:Choice xmlns:a14="http://schemas.microsoft.com/office/drawing/2010/main" Requires="a14">
+        <mc:AlternateContent xmlns:mc="http://schemas.openxmlformats.org/markup-compatibility/2006" xmlns:a14="http://schemas.microsoft.com/office/drawing/2010/main">
+          <mc:Choice Requires="a14">
             <p:sp>
               <p:nvSpPr>
                 <p:cNvPr id="4" name="CuadroTexto 3">
@@ -22842,7 +22851,7 @@
               </p:txBody>
             </p:sp>
           </mc:Choice>
-          <mc:Fallback>
+          <mc:Fallback xmlns="">
             <p:sp>
               <p:nvSpPr>
                 <p:cNvPr id="4" name="CuadroTexto 3">
@@ -22887,8 +22896,8 @@
             </p:sp>
           </mc:Fallback>
         </mc:AlternateContent>
-        <mc:AlternateContent xmlns:mc="http://schemas.openxmlformats.org/markup-compatibility/2006">
-          <mc:Choice xmlns:a14="http://schemas.microsoft.com/office/drawing/2010/main" Requires="a14">
+        <mc:AlternateContent xmlns:mc="http://schemas.openxmlformats.org/markup-compatibility/2006" xmlns:a14="http://schemas.microsoft.com/office/drawing/2010/main">
+          <mc:Choice Requires="a14">
             <p:sp>
               <p:nvSpPr>
                 <p:cNvPr id="5" name="CuadroTexto 4">
@@ -23025,7 +23034,7 @@
               </p:txBody>
             </p:sp>
           </mc:Choice>
-          <mc:Fallback>
+          <mc:Fallback xmlns="">
             <p:sp>
               <p:nvSpPr>
                 <p:cNvPr id="5" name="CuadroTexto 4">
@@ -23070,8 +23079,8 @@
             </p:sp>
           </mc:Fallback>
         </mc:AlternateContent>
-        <mc:AlternateContent xmlns:mc="http://schemas.openxmlformats.org/markup-compatibility/2006">
-          <mc:Choice xmlns:a14="http://schemas.microsoft.com/office/drawing/2010/main" Requires="a14">
+        <mc:AlternateContent xmlns:mc="http://schemas.openxmlformats.org/markup-compatibility/2006" xmlns:a14="http://schemas.microsoft.com/office/drawing/2010/main">
+          <mc:Choice Requires="a14">
             <p:sp>
               <p:nvSpPr>
                 <p:cNvPr id="6" name="CuadroTexto 5">
@@ -23208,7 +23217,7 @@
               </p:txBody>
             </p:sp>
           </mc:Choice>
-          <mc:Fallback>
+          <mc:Fallback xmlns="">
             <p:sp>
               <p:nvSpPr>
                 <p:cNvPr id="6" name="CuadroTexto 5">
@@ -23253,8 +23262,8 @@
             </p:sp>
           </mc:Fallback>
         </mc:AlternateContent>
-        <mc:AlternateContent xmlns:mc="http://schemas.openxmlformats.org/markup-compatibility/2006">
-          <mc:Choice xmlns:a14="http://schemas.microsoft.com/office/drawing/2010/main" Requires="a14">
+        <mc:AlternateContent xmlns:mc="http://schemas.openxmlformats.org/markup-compatibility/2006" xmlns:a14="http://schemas.microsoft.com/office/drawing/2010/main">
+          <mc:Choice Requires="a14">
             <p:sp>
               <p:nvSpPr>
                 <p:cNvPr id="7" name="CuadroTexto 6">
@@ -23391,7 +23400,7 @@
               </p:txBody>
             </p:sp>
           </mc:Choice>
-          <mc:Fallback>
+          <mc:Fallback xmlns="">
             <p:sp>
               <p:nvSpPr>
                 <p:cNvPr id="7" name="CuadroTexto 6">
@@ -23436,8 +23445,8 @@
             </p:sp>
           </mc:Fallback>
         </mc:AlternateContent>
-        <mc:AlternateContent xmlns:mc="http://schemas.openxmlformats.org/markup-compatibility/2006">
-          <mc:Choice xmlns:a14="http://schemas.microsoft.com/office/drawing/2010/main" Requires="a14">
+        <mc:AlternateContent xmlns:mc="http://schemas.openxmlformats.org/markup-compatibility/2006" xmlns:a14="http://schemas.microsoft.com/office/drawing/2010/main">
+          <mc:Choice Requires="a14">
             <p:sp>
               <p:nvSpPr>
                 <p:cNvPr id="8" name="CuadroTexto 7">
@@ -23574,7 +23583,7 @@
               </p:txBody>
             </p:sp>
           </mc:Choice>
-          <mc:Fallback>
+          <mc:Fallback xmlns="">
             <p:sp>
               <p:nvSpPr>
                 <p:cNvPr id="8" name="CuadroTexto 7">
@@ -23619,8 +23628,8 @@
             </p:sp>
           </mc:Fallback>
         </mc:AlternateContent>
-        <mc:AlternateContent xmlns:mc="http://schemas.openxmlformats.org/markup-compatibility/2006">
-          <mc:Choice xmlns:a14="http://schemas.microsoft.com/office/drawing/2010/main" Requires="a14">
+        <mc:AlternateContent xmlns:mc="http://schemas.openxmlformats.org/markup-compatibility/2006" xmlns:a14="http://schemas.microsoft.com/office/drawing/2010/main">
+          <mc:Choice Requires="a14">
             <p:sp>
               <p:nvSpPr>
                 <p:cNvPr id="9" name="CuadroTexto 8">
@@ -23757,7 +23766,7 @@
               </p:txBody>
             </p:sp>
           </mc:Choice>
-          <mc:Fallback>
+          <mc:Fallback xmlns="">
             <p:sp>
               <p:nvSpPr>
                 <p:cNvPr id="9" name="CuadroTexto 8">
@@ -23802,8 +23811,8 @@
             </p:sp>
           </mc:Fallback>
         </mc:AlternateContent>
-        <mc:AlternateContent xmlns:mc="http://schemas.openxmlformats.org/markup-compatibility/2006">
-          <mc:Choice xmlns:a14="http://schemas.microsoft.com/office/drawing/2010/main" Requires="a14">
+        <mc:AlternateContent xmlns:mc="http://schemas.openxmlformats.org/markup-compatibility/2006" xmlns:a14="http://schemas.microsoft.com/office/drawing/2010/main">
+          <mc:Choice Requires="a14">
             <p:sp>
               <p:nvSpPr>
                 <p:cNvPr id="10" name="CuadroTexto 9">
@@ -23940,7 +23949,7 @@
               </p:txBody>
             </p:sp>
           </mc:Choice>
-          <mc:Fallback>
+          <mc:Fallback xmlns="">
             <p:sp>
               <p:nvSpPr>
                 <p:cNvPr id="10" name="CuadroTexto 9">
@@ -23985,8 +23994,8 @@
             </p:sp>
           </mc:Fallback>
         </mc:AlternateContent>
-        <mc:AlternateContent xmlns:mc="http://schemas.openxmlformats.org/markup-compatibility/2006">
-          <mc:Choice xmlns:a14="http://schemas.microsoft.com/office/drawing/2010/main" Requires="a14">
+        <mc:AlternateContent xmlns:mc="http://schemas.openxmlformats.org/markup-compatibility/2006" xmlns:a14="http://schemas.microsoft.com/office/drawing/2010/main">
+          <mc:Choice Requires="a14">
             <p:sp>
               <p:nvSpPr>
                 <p:cNvPr id="11" name="CuadroTexto 10">
@@ -24123,7 +24132,7 @@
               </p:txBody>
             </p:sp>
           </mc:Choice>
-          <mc:Fallback>
+          <mc:Fallback xmlns="">
             <p:sp>
               <p:nvSpPr>
                 <p:cNvPr id="11" name="CuadroTexto 10">
@@ -24168,8 +24177,8 @@
             </p:sp>
           </mc:Fallback>
         </mc:AlternateContent>
-        <mc:AlternateContent xmlns:mc="http://schemas.openxmlformats.org/markup-compatibility/2006">
-          <mc:Choice xmlns:a14="http://schemas.microsoft.com/office/drawing/2010/main" Requires="a14">
+        <mc:AlternateContent xmlns:mc="http://schemas.openxmlformats.org/markup-compatibility/2006" xmlns:a14="http://schemas.microsoft.com/office/drawing/2010/main">
+          <mc:Choice Requires="a14">
             <p:sp>
               <p:nvSpPr>
                 <p:cNvPr id="12" name="CuadroTexto 11">
@@ -24306,7 +24315,7 @@
               </p:txBody>
             </p:sp>
           </mc:Choice>
-          <mc:Fallback>
+          <mc:Fallback xmlns="">
             <p:sp>
               <p:nvSpPr>
                 <p:cNvPr id="12" name="CuadroTexto 11">
@@ -24351,8 +24360,8 @@
             </p:sp>
           </mc:Fallback>
         </mc:AlternateContent>
-        <mc:AlternateContent xmlns:mc="http://schemas.openxmlformats.org/markup-compatibility/2006">
-          <mc:Choice xmlns:a14="http://schemas.microsoft.com/office/drawing/2010/main" Requires="a14">
+        <mc:AlternateContent xmlns:mc="http://schemas.openxmlformats.org/markup-compatibility/2006" xmlns:a14="http://schemas.microsoft.com/office/drawing/2010/main">
+          <mc:Choice Requires="a14">
             <p:sp>
               <p:nvSpPr>
                 <p:cNvPr id="13" name="Rectángulo 12">
@@ -24671,7 +24680,7 @@
               </p:txBody>
             </p:sp>
           </mc:Choice>
-          <mc:Fallback>
+          <mc:Fallback xmlns="">
             <p:sp>
               <p:nvSpPr>
                 <p:cNvPr id="13" name="Rectángulo 12">
@@ -24820,8 +24829,8 @@
           </a:p>
         </p:txBody>
       </p:sp>
-      <mc:AlternateContent xmlns:mc="http://schemas.openxmlformats.org/markup-compatibility/2006">
-        <mc:Choice xmlns:a14="http://schemas.microsoft.com/office/drawing/2010/main" Requires="a14">
+      <mc:AlternateContent xmlns:mc="http://schemas.openxmlformats.org/markup-compatibility/2006" xmlns:a14="http://schemas.microsoft.com/office/drawing/2010/main">
+        <mc:Choice Requires="a14">
           <p:sp>
             <p:nvSpPr>
               <p:cNvPr id="4" name="Marcador de contenido 2">
@@ -25357,7 +25366,7 @@
             </p:txBody>
           </p:sp>
         </mc:Choice>
-        <mc:Fallback>
+        <mc:Fallback xmlns="">
           <p:sp>
             <p:nvSpPr>
               <p:cNvPr id="4" name="Marcador de contenido 2">
@@ -25405,8 +25414,8 @@
           </p:sp>
         </mc:Fallback>
       </mc:AlternateContent>
-      <mc:AlternateContent xmlns:mc="http://schemas.openxmlformats.org/markup-compatibility/2006">
-        <mc:Choice xmlns:a14="http://schemas.microsoft.com/office/drawing/2010/main" Requires="a14">
+      <mc:AlternateContent xmlns:mc="http://schemas.openxmlformats.org/markup-compatibility/2006" xmlns:a14="http://schemas.microsoft.com/office/drawing/2010/main">
+        <mc:Choice Requires="a14">
           <p:sp>
             <p:nvSpPr>
               <p:cNvPr id="5" name="Marcador de contenido 2">
@@ -25739,16 +25748,7 @@
                               </a:solidFill>
                               <a:latin typeface="Cambria Math" panose="02040503050406030204" pitchFamily="18" charset="0"/>
                             </a:rPr>
-                            <m:t>𝑎</m:t>
-                          </m:r>
-                          <m:r>
-                            <a:rPr lang="es-AR" sz="2625" i="1">
-                              <a:solidFill>
-                                <a:prstClr val="black"/>
-                              </a:solidFill>
-                              <a:latin typeface="Cambria Math" panose="02040503050406030204" pitchFamily="18" charset="0"/>
-                            </a:rPr>
-                            <m:t>𝑏</m:t>
+                            <m:t>𝑎𝑏</m:t>
                           </m:r>
                         </m:sub>
                       </m:sSub>
@@ -25834,16 +25834,7 @@
                               </a:solidFill>
                               <a:latin typeface="Cambria Math" panose="02040503050406030204" pitchFamily="18" charset="0"/>
                             </a:rPr>
-                            <m:t>𝑏</m:t>
-                          </m:r>
-                          <m:r>
-                            <a:rPr lang="es-AR" sz="2625" i="1">
-                              <a:solidFill>
-                                <a:prstClr val="black"/>
-                              </a:solidFill>
-                              <a:latin typeface="Cambria Math" panose="02040503050406030204" pitchFamily="18" charset="0"/>
-                            </a:rPr>
-                            <m:t>𝑏</m:t>
+                            <m:t>𝑏𝑏</m:t>
                           </m:r>
                         </m:sub>
                       </m:sSub>
@@ -25929,16 +25920,7 @@
                               </a:solidFill>
                               <a:latin typeface="Cambria Math" panose="02040503050406030204" pitchFamily="18" charset="0"/>
                             </a:rPr>
-                            <m:t>𝑐</m:t>
-                          </m:r>
-                          <m:r>
-                            <a:rPr lang="es-AR" sz="2625" i="1">
-                              <a:solidFill>
-                                <a:prstClr val="black"/>
-                              </a:solidFill>
-                              <a:latin typeface="Cambria Math" panose="02040503050406030204" pitchFamily="18" charset="0"/>
-                            </a:rPr>
-                            <m:t>𝑏</m:t>
+                            <m:t>𝑐𝑏</m:t>
                           </m:r>
                         </m:sub>
                       </m:sSub>
@@ -25970,7 +25952,7 @@
             </p:txBody>
           </p:sp>
         </mc:Choice>
-        <mc:Fallback>
+        <mc:Fallback xmlns="">
           <p:sp>
             <p:nvSpPr>
               <p:cNvPr id="5" name="Marcador de contenido 2">
@@ -26085,8 +26067,8 @@
               <a:chExt cx="5446856" cy="4960693"/>
             </a:xfrm>
           </p:grpSpPr>
-          <mc:AlternateContent xmlns:mc="http://schemas.openxmlformats.org/markup-compatibility/2006">
-            <mc:Choice xmlns:a14="http://schemas.microsoft.com/office/drawing/2010/main" Requires="a14">
+          <mc:AlternateContent xmlns:mc="http://schemas.openxmlformats.org/markup-compatibility/2006" xmlns:a14="http://schemas.microsoft.com/office/drawing/2010/main">
+            <mc:Choice Requires="a14">
               <p:sp>
                 <p:nvSpPr>
                   <p:cNvPr id="9" name="CuadroTexto 8">
@@ -26179,7 +26161,7 @@
                 </p:txBody>
               </p:sp>
             </mc:Choice>
-            <mc:Fallback>
+            <mc:Fallback xmlns="">
               <p:sp>
                 <p:nvSpPr>
                   <p:cNvPr id="9" name="CuadroTexto 8">
@@ -26224,8 +26206,8 @@
               </p:sp>
             </mc:Fallback>
           </mc:AlternateContent>
-          <mc:AlternateContent xmlns:mc="http://schemas.openxmlformats.org/markup-compatibility/2006">
-            <mc:Choice xmlns:a14="http://schemas.microsoft.com/office/drawing/2010/main" Requires="a14">
+          <mc:AlternateContent xmlns:mc="http://schemas.openxmlformats.org/markup-compatibility/2006" xmlns:a14="http://schemas.microsoft.com/office/drawing/2010/main">
+            <mc:Choice Requires="a14">
               <p:sp>
                 <p:nvSpPr>
                   <p:cNvPr id="10" name="CuadroTexto 9">
@@ -26318,7 +26300,7 @@
                 </p:txBody>
               </p:sp>
             </mc:Choice>
-            <mc:Fallback>
+            <mc:Fallback xmlns="">
               <p:sp>
                 <p:nvSpPr>
                   <p:cNvPr id="10" name="CuadroTexto 9">
@@ -26363,8 +26345,8 @@
               </p:sp>
             </mc:Fallback>
           </mc:AlternateContent>
-          <mc:AlternateContent xmlns:mc="http://schemas.openxmlformats.org/markup-compatibility/2006">
-            <mc:Choice xmlns:a14="http://schemas.microsoft.com/office/drawing/2010/main" Requires="a14">
+          <mc:AlternateContent xmlns:mc="http://schemas.openxmlformats.org/markup-compatibility/2006" xmlns:a14="http://schemas.microsoft.com/office/drawing/2010/main">
+            <mc:Choice Requires="a14">
               <p:sp>
                 <p:nvSpPr>
                   <p:cNvPr id="11" name="CuadroTexto 10">
@@ -26457,7 +26439,7 @@
                 </p:txBody>
               </p:sp>
             </mc:Choice>
-            <mc:Fallback>
+            <mc:Fallback xmlns="">
               <p:sp>
                 <p:nvSpPr>
                   <p:cNvPr id="11" name="CuadroTexto 10">
@@ -26502,8 +26484,8 @@
               </p:sp>
             </mc:Fallback>
           </mc:AlternateContent>
-          <mc:AlternateContent xmlns:mc="http://schemas.openxmlformats.org/markup-compatibility/2006">
-            <mc:Choice xmlns:a14="http://schemas.microsoft.com/office/drawing/2010/main" Requires="a14">
+          <mc:AlternateContent xmlns:mc="http://schemas.openxmlformats.org/markup-compatibility/2006" xmlns:a14="http://schemas.microsoft.com/office/drawing/2010/main">
+            <mc:Choice Requires="a14">
               <p:sp>
                 <p:nvSpPr>
                   <p:cNvPr id="12" name="CuadroTexto 11">
@@ -26596,7 +26578,7 @@
                 </p:txBody>
               </p:sp>
             </mc:Choice>
-            <mc:Fallback>
+            <mc:Fallback xmlns="">
               <p:sp>
                 <p:nvSpPr>
                   <p:cNvPr id="12" name="CuadroTexto 11">
@@ -26641,8 +26623,8 @@
               </p:sp>
             </mc:Fallback>
           </mc:AlternateContent>
-          <mc:AlternateContent xmlns:mc="http://schemas.openxmlformats.org/markup-compatibility/2006">
-            <mc:Choice xmlns:a14="http://schemas.microsoft.com/office/drawing/2010/main" Requires="a14">
+          <mc:AlternateContent xmlns:mc="http://schemas.openxmlformats.org/markup-compatibility/2006" xmlns:a14="http://schemas.microsoft.com/office/drawing/2010/main">
+            <mc:Choice Requires="a14">
               <p:sp>
                 <p:nvSpPr>
                   <p:cNvPr id="13" name="CuadroTexto 12">
@@ -26735,7 +26717,7 @@
                 </p:txBody>
               </p:sp>
             </mc:Choice>
-            <mc:Fallback>
+            <mc:Fallback xmlns="">
               <p:sp>
                 <p:nvSpPr>
                   <p:cNvPr id="13" name="CuadroTexto 12">
@@ -26780,8 +26762,8 @@
               </p:sp>
             </mc:Fallback>
           </mc:AlternateContent>
-          <mc:AlternateContent xmlns:mc="http://schemas.openxmlformats.org/markup-compatibility/2006">
-            <mc:Choice xmlns:a14="http://schemas.microsoft.com/office/drawing/2010/main" Requires="a14">
+          <mc:AlternateContent xmlns:mc="http://schemas.openxmlformats.org/markup-compatibility/2006" xmlns:a14="http://schemas.microsoft.com/office/drawing/2010/main">
+            <mc:Choice Requires="a14">
               <p:sp>
                 <p:nvSpPr>
                   <p:cNvPr id="14" name="CuadroTexto 13">
@@ -26874,7 +26856,7 @@
                 </p:txBody>
               </p:sp>
             </mc:Choice>
-            <mc:Fallback>
+            <mc:Fallback xmlns="">
               <p:sp>
                 <p:nvSpPr>
                   <p:cNvPr id="14" name="CuadroTexto 13">
@@ -26919,8 +26901,8 @@
               </p:sp>
             </mc:Fallback>
           </mc:AlternateContent>
-          <mc:AlternateContent xmlns:mc="http://schemas.openxmlformats.org/markup-compatibility/2006">
-            <mc:Choice xmlns:a14="http://schemas.microsoft.com/office/drawing/2010/main" Requires="a14">
+          <mc:AlternateContent xmlns:mc="http://schemas.openxmlformats.org/markup-compatibility/2006" xmlns:a14="http://schemas.microsoft.com/office/drawing/2010/main">
+            <mc:Choice Requires="a14">
               <p:sp>
                 <p:nvSpPr>
                   <p:cNvPr id="15" name="CuadroTexto 14">
@@ -27013,7 +26995,7 @@
                 </p:txBody>
               </p:sp>
             </mc:Choice>
-            <mc:Fallback>
+            <mc:Fallback xmlns="">
               <p:sp>
                 <p:nvSpPr>
                   <p:cNvPr id="15" name="CuadroTexto 14">
@@ -27058,8 +27040,8 @@
               </p:sp>
             </mc:Fallback>
           </mc:AlternateContent>
-          <mc:AlternateContent xmlns:mc="http://schemas.openxmlformats.org/markup-compatibility/2006">
-            <mc:Choice xmlns:a14="http://schemas.microsoft.com/office/drawing/2010/main" Requires="a14">
+          <mc:AlternateContent xmlns:mc="http://schemas.openxmlformats.org/markup-compatibility/2006" xmlns:a14="http://schemas.microsoft.com/office/drawing/2010/main">
+            <mc:Choice Requires="a14">
               <p:sp>
                 <p:nvSpPr>
                   <p:cNvPr id="16" name="CuadroTexto 15">
@@ -27152,7 +27134,7 @@
                 </p:txBody>
               </p:sp>
             </mc:Choice>
-            <mc:Fallback>
+            <mc:Fallback xmlns="">
               <p:sp>
                 <p:nvSpPr>
                   <p:cNvPr id="16" name="CuadroTexto 15">
@@ -27197,8 +27179,8 @@
               </p:sp>
             </mc:Fallback>
           </mc:AlternateContent>
-          <mc:AlternateContent xmlns:mc="http://schemas.openxmlformats.org/markup-compatibility/2006">
-            <mc:Choice xmlns:a14="http://schemas.microsoft.com/office/drawing/2010/main" Requires="a14">
+          <mc:AlternateContent xmlns:mc="http://schemas.openxmlformats.org/markup-compatibility/2006" xmlns:a14="http://schemas.microsoft.com/office/drawing/2010/main">
+            <mc:Choice Requires="a14">
               <p:sp>
                 <p:nvSpPr>
                   <p:cNvPr id="17" name="CuadroTexto 16">
@@ -27291,7 +27273,7 @@
                 </p:txBody>
               </p:sp>
             </mc:Choice>
-            <mc:Fallback>
+            <mc:Fallback xmlns="">
               <p:sp>
                 <p:nvSpPr>
                   <p:cNvPr id="17" name="CuadroTexto 16">
@@ -27441,8 +27423,8 @@
           </a:p>
         </p:txBody>
       </p:sp>
-      <mc:AlternateContent xmlns:mc="http://schemas.openxmlformats.org/markup-compatibility/2006">
-        <mc:Choice xmlns:a14="http://schemas.microsoft.com/office/drawing/2010/main" Requires="a14">
+      <mc:AlternateContent xmlns:mc="http://schemas.openxmlformats.org/markup-compatibility/2006" xmlns:a14="http://schemas.microsoft.com/office/drawing/2010/main">
+        <mc:Choice Requires="a14">
           <p:sp>
             <p:nvSpPr>
               <p:cNvPr id="3" name="Marcador de contenido 2">
@@ -27978,7 +27960,7 @@
             </p:txBody>
           </p:sp>
         </mc:Choice>
-        <mc:Fallback>
+        <mc:Fallback xmlns="">
           <p:sp>
             <p:nvSpPr>
               <p:cNvPr id="3" name="Marcador de contenido 2">
@@ -28026,8 +28008,8 @@
           </p:sp>
         </mc:Fallback>
       </mc:AlternateContent>
-      <mc:AlternateContent xmlns:mc="http://schemas.openxmlformats.org/markup-compatibility/2006">
-        <mc:Choice xmlns:a14="http://schemas.microsoft.com/office/drawing/2010/main" Requires="a14">
+      <mc:AlternateContent xmlns:mc="http://schemas.openxmlformats.org/markup-compatibility/2006" xmlns:a14="http://schemas.microsoft.com/office/drawing/2010/main">
+        <mc:Choice Requires="a14">
           <p:sp>
             <p:nvSpPr>
               <p:cNvPr id="4" name="CuadroTexto 3">
@@ -29552,7 +29534,7 @@
             </p:txBody>
           </p:sp>
         </mc:Choice>
-        <mc:Fallback>
+        <mc:Fallback xmlns="">
           <p:sp>
             <p:nvSpPr>
               <p:cNvPr id="4" name="CuadroTexto 3">
@@ -29776,8 +29758,8 @@
             </a:fontRef>
           </p:style>
         </p:cxnSp>
-        <mc:AlternateContent xmlns:mc="http://schemas.openxmlformats.org/markup-compatibility/2006">
-          <mc:Choice xmlns:a14="http://schemas.microsoft.com/office/drawing/2010/main" Requires="a14">
+        <mc:AlternateContent xmlns:mc="http://schemas.openxmlformats.org/markup-compatibility/2006" xmlns:a14="http://schemas.microsoft.com/office/drawing/2010/main">
+          <mc:Choice Requires="a14">
             <p:sp>
               <p:nvSpPr>
                 <p:cNvPr id="9" name="Rectángulo 8">
@@ -30188,7 +30170,7 @@
               </p:txBody>
             </p:sp>
           </mc:Choice>
-          <mc:Fallback>
+          <mc:Fallback xmlns="">
             <p:sp>
               <p:nvSpPr>
                 <p:cNvPr id="9" name="Rectángulo 8">
@@ -30721,8 +30703,8 @@
           </a:p>
         </p:txBody>
       </p:sp>
-      <mc:AlternateContent xmlns:mc="http://schemas.openxmlformats.org/markup-compatibility/2006">
-        <mc:Choice xmlns:a14="http://schemas.microsoft.com/office/drawing/2010/main" Requires="a14">
+      <mc:AlternateContent xmlns:mc="http://schemas.openxmlformats.org/markup-compatibility/2006" xmlns:a14="http://schemas.microsoft.com/office/drawing/2010/main">
+        <mc:Choice Requires="a14">
           <p:sp>
             <p:nvSpPr>
               <p:cNvPr id="10" name="Rectángulo 9">
@@ -31603,7 +31585,7 @@
             </p:txBody>
           </p:sp>
         </mc:Choice>
-        <mc:Fallback>
+        <mc:Fallback xmlns="">
           <p:sp>
             <p:nvSpPr>
               <p:cNvPr id="10" name="Rectángulo 9">
@@ -31648,8 +31630,8 @@
           </p:sp>
         </mc:Fallback>
       </mc:AlternateContent>
-      <mc:AlternateContent xmlns:mc="http://schemas.openxmlformats.org/markup-compatibility/2006">
-        <mc:Choice xmlns:a14="http://schemas.microsoft.com/office/drawing/2010/main" Requires="a14">
+      <mc:AlternateContent xmlns:mc="http://schemas.openxmlformats.org/markup-compatibility/2006" xmlns:a14="http://schemas.microsoft.com/office/drawing/2010/main">
+        <mc:Choice Requires="a14">
           <p:sp>
             <p:nvSpPr>
               <p:cNvPr id="11" name="Rectángulo 10">
@@ -32026,7 +32008,7 @@
             </p:txBody>
           </p:sp>
         </mc:Choice>
-        <mc:Fallback>
+        <mc:Fallback xmlns="">
           <p:sp>
             <p:nvSpPr>
               <p:cNvPr id="11" name="Rectángulo 10">
@@ -32177,8 +32159,8 @@
           </a:p>
         </p:txBody>
       </p:sp>
-      <mc:AlternateContent xmlns:mc="http://schemas.openxmlformats.org/markup-compatibility/2006">
-        <mc:Choice xmlns:a14="http://schemas.microsoft.com/office/drawing/2010/main" Requires="a14">
+      <mc:AlternateContent xmlns:mc="http://schemas.openxmlformats.org/markup-compatibility/2006" xmlns:a14="http://schemas.microsoft.com/office/drawing/2010/main">
+        <mc:Choice Requires="a14">
           <p:sp>
             <p:nvSpPr>
               <p:cNvPr id="14" name="Rectángulo 13">
@@ -32526,7 +32508,7 @@
             </p:txBody>
           </p:sp>
         </mc:Choice>
-        <mc:Fallback>
+        <mc:Fallback xmlns="">
           <p:sp>
             <p:nvSpPr>
               <p:cNvPr id="14" name="Rectángulo 13">
@@ -32832,8 +32814,8 @@
           </a:p>
         </p:txBody>
       </p:sp>
-      <mc:AlternateContent xmlns:mc="http://schemas.openxmlformats.org/markup-compatibility/2006">
-        <mc:Choice xmlns:a14="http://schemas.microsoft.com/office/drawing/2010/main" Requires="a14">
+      <mc:AlternateContent xmlns:mc="http://schemas.openxmlformats.org/markup-compatibility/2006" xmlns:a14="http://schemas.microsoft.com/office/drawing/2010/main">
+        <mc:Choice Requires="a14">
           <p:sp>
             <p:nvSpPr>
               <p:cNvPr id="3" name="Rectángulo 2">
@@ -33027,7 +33009,7 @@
             </p:txBody>
           </p:sp>
         </mc:Choice>
-        <mc:Fallback>
+        <mc:Fallback xmlns="">
           <p:sp>
             <p:nvSpPr>
               <p:cNvPr id="3" name="Rectángulo 2">
@@ -33072,8 +33054,8 @@
           </p:sp>
         </mc:Fallback>
       </mc:AlternateContent>
-      <mc:AlternateContent xmlns:mc="http://schemas.openxmlformats.org/markup-compatibility/2006">
-        <mc:Choice xmlns:a14="http://schemas.microsoft.com/office/drawing/2010/main" Requires="a14">
+      <mc:AlternateContent xmlns:mc="http://schemas.openxmlformats.org/markup-compatibility/2006" xmlns:a14="http://schemas.microsoft.com/office/drawing/2010/main">
+        <mc:Choice Requires="a14">
           <p:sp>
             <p:nvSpPr>
               <p:cNvPr id="4" name="Rectángulo 3">
@@ -33525,7 +33507,7 @@
             </p:txBody>
           </p:sp>
         </mc:Choice>
-        <mc:Fallback>
+        <mc:Fallback xmlns="">
           <p:sp>
             <p:nvSpPr>
               <p:cNvPr id="4" name="Rectángulo 3">
@@ -33570,8 +33552,8 @@
           </p:sp>
         </mc:Fallback>
       </mc:AlternateContent>
-      <mc:AlternateContent xmlns:mc="http://schemas.openxmlformats.org/markup-compatibility/2006">
-        <mc:Choice xmlns:a14="http://schemas.microsoft.com/office/drawing/2010/main" Requires="a14">
+      <mc:AlternateContent xmlns:mc="http://schemas.openxmlformats.org/markup-compatibility/2006" xmlns:a14="http://schemas.microsoft.com/office/drawing/2010/main">
+        <mc:Choice Requires="a14">
           <p:sp>
             <p:nvSpPr>
               <p:cNvPr id="5" name="Rectángulo 4">
@@ -33843,7 +33825,7 @@
             </p:txBody>
           </p:sp>
         </mc:Choice>
-        <mc:Fallback>
+        <mc:Fallback xmlns="">
           <p:sp>
             <p:nvSpPr>
               <p:cNvPr id="5" name="Rectángulo 4">

</xml_diff>